<commit_message>
committing changes in ppt
</commit_message>
<xml_diff>
--- a/OnlineMedico-Team A.pptx
+++ b/OnlineMedico-Team A.pptx
@@ -4507,13 +4507,7 @@
             <a:rPr lang="en-US" dirty="0" smtClean="0">
               <a:latin typeface="+mj-lt"/>
             </a:rPr>
-            <a:t>Header &amp; </a:t>
-          </a:r>
-          <a:r>
-            <a:rPr lang="en-US" dirty="0" smtClean="0">
-              <a:latin typeface="+mj-lt"/>
-            </a:rPr>
-            <a:t>Footer for user and admin</a:t>
+            <a:t>Header &amp; Footer for user and admin</a:t>
           </a:r>
           <a:endParaRPr lang="en-US" dirty="0">
             <a:latin typeface="+mj-lt"/>
@@ -4720,13 +4714,7 @@
             <a:rPr lang="en-US" dirty="0" smtClean="0">
               <a:latin typeface="+mj-lt"/>
             </a:rPr>
-            <a:t>Admin drug </a:t>
-          </a:r>
-          <a:r>
-            <a:rPr lang="en-US" dirty="0" smtClean="0">
-              <a:latin typeface="+mj-lt"/>
-            </a:rPr>
-            <a:t>management – add products</a:t>
+            <a:t>Admin drug management – add products</a:t>
           </a:r>
           <a:endParaRPr lang="en-US" dirty="0">
             <a:latin typeface="+mj-lt"/>
@@ -4911,25 +4899,25 @@
     </dgm:pt>
   </dgm:ptLst>
   <dgm:cxnLst>
+    <dgm:cxn modelId="{045A973B-2793-4233-B0DD-A06A4D9E568A}" srcId="{B7B4D503-0B80-4460-922F-678D7B3B9A0D}" destId="{35CE50FE-FA6B-438A-BDBA-9B273E6736BA}" srcOrd="0" destOrd="0" parTransId="{041EA2AA-79BF-4E81-BE26-7602451C547A}" sibTransId="{5E917E99-E082-4E09-A2C0-44C12F971A6A}"/>
+    <dgm:cxn modelId="{902CD2DD-C76E-40C7-AEFE-A11AAFCD6257}" srcId="{35CE50FE-FA6B-438A-BDBA-9B273E6736BA}" destId="{7DED1B62-41DC-4AD4-B989-FC469CC2D763}" srcOrd="1" destOrd="0" parTransId="{6590E6DB-E45B-439F-93CC-08D94F5F2B52}" sibTransId="{3BC17EA7-8E74-44CF-A06F-9BFC6FCBCE62}"/>
+    <dgm:cxn modelId="{BD749631-4A51-4D09-829F-95D400FFECE5}" type="presOf" srcId="{866A947F-83BE-480D-AA6F-593F9E9D094C}" destId="{F27E4A0C-8745-4FF3-8C34-9AD928BBECE8}" srcOrd="0" destOrd="0" presId="urn:microsoft.com/office/officeart/2005/8/layout/list1#2"/>
+    <dgm:cxn modelId="{6773798E-A682-4CF5-B382-CED39440F60F}" srcId="{B7B4D503-0B80-4460-922F-678D7B3B9A0D}" destId="{866A947F-83BE-480D-AA6F-593F9E9D094C}" srcOrd="1" destOrd="0" parTransId="{918CCBE6-D77D-4925-BB46-AC3B1AF0AA52}" sibTransId="{F1151127-47D2-4FB3-9E04-AAF4C7994627}"/>
+    <dgm:cxn modelId="{A5384069-73EE-42BC-8222-CAEE05BED72C}" srcId="{35CE50FE-FA6B-438A-BDBA-9B273E6736BA}" destId="{BEB2312E-DB4A-478A-A8C6-C686B60607D3}" srcOrd="3" destOrd="0" parTransId="{373B9461-DF39-4F49-ABAD-B5DFD097298A}" sibTransId="{EEE6143A-3EB2-4E69-8B1E-0D9F3232D4C0}"/>
+    <dgm:cxn modelId="{5DA867DB-4E75-42E6-8B5A-1F2B65992BA7}" type="presOf" srcId="{B7B4D503-0B80-4460-922F-678D7B3B9A0D}" destId="{01DD0F12-12F5-4D40-B8E1-50F8BA73202A}" srcOrd="0" destOrd="0" presId="urn:microsoft.com/office/officeart/2005/8/layout/list1#2"/>
+    <dgm:cxn modelId="{2C0DDD6F-C6EB-4D4C-8AD4-C24ABE4E3183}" type="presOf" srcId="{586C280D-BF87-4C53-8548-F9FA669743FD}" destId="{8CFD94E9-0E72-4332-BB5E-36BB60412F17}" srcOrd="0" destOrd="1" presId="urn:microsoft.com/office/officeart/2005/8/layout/list1#2"/>
+    <dgm:cxn modelId="{9DC7DB94-BA09-4B66-A28F-BDA24BFDCDDA}" type="presOf" srcId="{766D07A8-75F4-4550-B24D-C41DF920BC75}" destId="{8CFD94E9-0E72-4332-BB5E-36BB60412F17}" srcOrd="0" destOrd="0" presId="urn:microsoft.com/office/officeart/2005/8/layout/list1#2"/>
+    <dgm:cxn modelId="{5305BA61-0A08-4872-A7E9-3CD59AD4FB27}" type="presOf" srcId="{1BEA5EA1-0903-46A8-953C-BFAA6380B894}" destId="{F901923D-E6E1-47FE-BE41-8B8C66EFA3AF}" srcOrd="0" destOrd="0" presId="urn:microsoft.com/office/officeart/2005/8/layout/list1#2"/>
+    <dgm:cxn modelId="{88A3F266-35D7-4FDB-933A-458FE36B4276}" srcId="{35CE50FE-FA6B-438A-BDBA-9B273E6736BA}" destId="{1BEA5EA1-0903-46A8-953C-BFAA6380B894}" srcOrd="0" destOrd="0" parTransId="{7626BE01-410B-4FBC-9DCD-AD255D9CA577}" sibTransId="{15DC27B7-EAE1-49A7-A1B5-0F3DE3D43C37}"/>
+    <dgm:cxn modelId="{34F6EED6-6C39-467C-8D17-7C109D63E813}" srcId="{35CE50FE-FA6B-438A-BDBA-9B273E6736BA}" destId="{C80B9BBB-7997-479F-9BEB-B2AC981E55E1}" srcOrd="2" destOrd="0" parTransId="{9597E527-C718-4564-AEF6-FD1540EFBD81}" sibTransId="{25C0A339-F552-4076-B025-A64D6230C480}"/>
+    <dgm:cxn modelId="{CD2140BB-2C93-47B8-ACA3-E8203BF2DBB4}" type="presOf" srcId="{35CE50FE-FA6B-438A-BDBA-9B273E6736BA}" destId="{1DA2DBA8-FF13-4046-9A4B-FA26A7A8AE04}" srcOrd="0" destOrd="0" presId="urn:microsoft.com/office/officeart/2005/8/layout/list1#2"/>
+    <dgm:cxn modelId="{7708C270-967C-442B-81C1-5B9B5889E580}" type="presOf" srcId="{C80B9BBB-7997-479F-9BEB-B2AC981E55E1}" destId="{F901923D-E6E1-47FE-BE41-8B8C66EFA3AF}" srcOrd="0" destOrd="2" presId="urn:microsoft.com/office/officeart/2005/8/layout/list1#2"/>
+    <dgm:cxn modelId="{616014B8-5EA9-468B-AA28-3B3AA150124B}" srcId="{866A947F-83BE-480D-AA6F-593F9E9D094C}" destId="{586C280D-BF87-4C53-8548-F9FA669743FD}" srcOrd="1" destOrd="0" parTransId="{264FEF18-CAB3-40BE-BC16-B93ED2E57406}" sibTransId="{DD0E8B61-FD8B-40C8-A0E2-3D5C0AB8F257}"/>
+    <dgm:cxn modelId="{BC1284B4-968B-4289-877F-5AD47B27CBE8}" type="presOf" srcId="{BEB2312E-DB4A-478A-A8C6-C686B60607D3}" destId="{F901923D-E6E1-47FE-BE41-8B8C66EFA3AF}" srcOrd="0" destOrd="3" presId="urn:microsoft.com/office/officeart/2005/8/layout/list1#2"/>
+    <dgm:cxn modelId="{F6AE2949-5FAF-4ACD-A69C-6BCE438BAC64}" type="presOf" srcId="{866A947F-83BE-480D-AA6F-593F9E9D094C}" destId="{D30DD92C-7916-4FD7-9816-0AB63801BF73}" srcOrd="1" destOrd="0" presId="urn:microsoft.com/office/officeart/2005/8/layout/list1#2"/>
     <dgm:cxn modelId="{876CB1BD-F97D-4315-AF3C-4B8873154413}" type="presOf" srcId="{35CE50FE-FA6B-438A-BDBA-9B273E6736BA}" destId="{E022AD64-6C14-41D5-BC9F-2BFBC0D6C3E0}" srcOrd="1" destOrd="0" presId="urn:microsoft.com/office/officeart/2005/8/layout/list1#2"/>
-    <dgm:cxn modelId="{34F6EED6-6C39-467C-8D17-7C109D63E813}" srcId="{35CE50FE-FA6B-438A-BDBA-9B273E6736BA}" destId="{C80B9BBB-7997-479F-9BEB-B2AC981E55E1}" srcOrd="2" destOrd="0" parTransId="{9597E527-C718-4564-AEF6-FD1540EFBD81}" sibTransId="{25C0A339-F552-4076-B025-A64D6230C480}"/>
-    <dgm:cxn modelId="{7708C270-967C-442B-81C1-5B9B5889E580}" type="presOf" srcId="{C80B9BBB-7997-479F-9BEB-B2AC981E55E1}" destId="{F901923D-E6E1-47FE-BE41-8B8C66EFA3AF}" srcOrd="0" destOrd="2" presId="urn:microsoft.com/office/officeart/2005/8/layout/list1#2"/>
-    <dgm:cxn modelId="{F6AE2949-5FAF-4ACD-A69C-6BCE438BAC64}" type="presOf" srcId="{866A947F-83BE-480D-AA6F-593F9E9D094C}" destId="{D30DD92C-7916-4FD7-9816-0AB63801BF73}" srcOrd="1" destOrd="0" presId="urn:microsoft.com/office/officeart/2005/8/layout/list1#2"/>
-    <dgm:cxn modelId="{6773798E-A682-4CF5-B382-CED39440F60F}" srcId="{B7B4D503-0B80-4460-922F-678D7B3B9A0D}" destId="{866A947F-83BE-480D-AA6F-593F9E9D094C}" srcOrd="1" destOrd="0" parTransId="{918CCBE6-D77D-4925-BB46-AC3B1AF0AA52}" sibTransId="{F1151127-47D2-4FB3-9E04-AAF4C7994627}"/>
-    <dgm:cxn modelId="{616014B8-5EA9-468B-AA28-3B3AA150124B}" srcId="{866A947F-83BE-480D-AA6F-593F9E9D094C}" destId="{586C280D-BF87-4C53-8548-F9FA669743FD}" srcOrd="1" destOrd="0" parTransId="{264FEF18-CAB3-40BE-BC16-B93ED2E57406}" sibTransId="{DD0E8B61-FD8B-40C8-A0E2-3D5C0AB8F257}"/>
-    <dgm:cxn modelId="{CD2140BB-2C93-47B8-ACA3-E8203BF2DBB4}" type="presOf" srcId="{35CE50FE-FA6B-438A-BDBA-9B273E6736BA}" destId="{1DA2DBA8-FF13-4046-9A4B-FA26A7A8AE04}" srcOrd="0" destOrd="0" presId="urn:microsoft.com/office/officeart/2005/8/layout/list1#2"/>
-    <dgm:cxn modelId="{2C0DDD6F-C6EB-4D4C-8AD4-C24ABE4E3183}" type="presOf" srcId="{586C280D-BF87-4C53-8548-F9FA669743FD}" destId="{8CFD94E9-0E72-4332-BB5E-36BB60412F17}" srcOrd="0" destOrd="1" presId="urn:microsoft.com/office/officeart/2005/8/layout/list1#2"/>
     <dgm:cxn modelId="{81C2E732-AA19-441B-A0A3-5E026EAC430B}" srcId="{866A947F-83BE-480D-AA6F-593F9E9D094C}" destId="{766D07A8-75F4-4550-B24D-C41DF920BC75}" srcOrd="0" destOrd="0" parTransId="{6A268530-93C2-468C-9749-C96E4BCBCA8D}" sibTransId="{F94A9010-67F7-4322-B0FD-DA78A9019B18}"/>
-    <dgm:cxn modelId="{9DC7DB94-BA09-4B66-A28F-BDA24BFDCDDA}" type="presOf" srcId="{766D07A8-75F4-4550-B24D-C41DF920BC75}" destId="{8CFD94E9-0E72-4332-BB5E-36BB60412F17}" srcOrd="0" destOrd="0" presId="urn:microsoft.com/office/officeart/2005/8/layout/list1#2"/>
-    <dgm:cxn modelId="{5DA867DB-4E75-42E6-8B5A-1F2B65992BA7}" type="presOf" srcId="{B7B4D503-0B80-4460-922F-678D7B3B9A0D}" destId="{01DD0F12-12F5-4D40-B8E1-50F8BA73202A}" srcOrd="0" destOrd="0" presId="urn:microsoft.com/office/officeart/2005/8/layout/list1#2"/>
-    <dgm:cxn modelId="{5305BA61-0A08-4872-A7E9-3CD59AD4FB27}" type="presOf" srcId="{1BEA5EA1-0903-46A8-953C-BFAA6380B894}" destId="{F901923D-E6E1-47FE-BE41-8B8C66EFA3AF}" srcOrd="0" destOrd="0" presId="urn:microsoft.com/office/officeart/2005/8/layout/list1#2"/>
-    <dgm:cxn modelId="{902CD2DD-C76E-40C7-AEFE-A11AAFCD6257}" srcId="{35CE50FE-FA6B-438A-BDBA-9B273E6736BA}" destId="{7DED1B62-41DC-4AD4-B989-FC469CC2D763}" srcOrd="1" destOrd="0" parTransId="{6590E6DB-E45B-439F-93CC-08D94F5F2B52}" sibTransId="{3BC17EA7-8E74-44CF-A06F-9BFC6FCBCE62}"/>
-    <dgm:cxn modelId="{BC1284B4-968B-4289-877F-5AD47B27CBE8}" type="presOf" srcId="{BEB2312E-DB4A-478A-A8C6-C686B60607D3}" destId="{F901923D-E6E1-47FE-BE41-8B8C66EFA3AF}" srcOrd="0" destOrd="3" presId="urn:microsoft.com/office/officeart/2005/8/layout/list1#2"/>
     <dgm:cxn modelId="{E6C5E4A5-7CF1-453F-BEE7-748210E530C5}" type="presOf" srcId="{7DED1B62-41DC-4AD4-B989-FC469CC2D763}" destId="{F901923D-E6E1-47FE-BE41-8B8C66EFA3AF}" srcOrd="0" destOrd="1" presId="urn:microsoft.com/office/officeart/2005/8/layout/list1#2"/>
-    <dgm:cxn modelId="{BD749631-4A51-4D09-829F-95D400FFECE5}" type="presOf" srcId="{866A947F-83BE-480D-AA6F-593F9E9D094C}" destId="{F27E4A0C-8745-4FF3-8C34-9AD928BBECE8}" srcOrd="0" destOrd="0" presId="urn:microsoft.com/office/officeart/2005/8/layout/list1#2"/>
-    <dgm:cxn modelId="{88A3F266-35D7-4FDB-933A-458FE36B4276}" srcId="{35CE50FE-FA6B-438A-BDBA-9B273E6736BA}" destId="{1BEA5EA1-0903-46A8-953C-BFAA6380B894}" srcOrd="0" destOrd="0" parTransId="{7626BE01-410B-4FBC-9DCD-AD255D9CA577}" sibTransId="{15DC27B7-EAE1-49A7-A1B5-0F3DE3D43C37}"/>
-    <dgm:cxn modelId="{A5384069-73EE-42BC-8222-CAEE05BED72C}" srcId="{35CE50FE-FA6B-438A-BDBA-9B273E6736BA}" destId="{BEB2312E-DB4A-478A-A8C6-C686B60607D3}" srcOrd="3" destOrd="0" parTransId="{373B9461-DF39-4F49-ABAD-B5DFD097298A}" sibTransId="{EEE6143A-3EB2-4E69-8B1E-0D9F3232D4C0}"/>
-    <dgm:cxn modelId="{045A973B-2793-4233-B0DD-A06A4D9E568A}" srcId="{B7B4D503-0B80-4460-922F-678D7B3B9A0D}" destId="{35CE50FE-FA6B-438A-BDBA-9B273E6736BA}" srcOrd="0" destOrd="0" parTransId="{041EA2AA-79BF-4E81-BE26-7602451C547A}" sibTransId="{5E917E99-E082-4E09-A2C0-44C12F971A6A}"/>
     <dgm:cxn modelId="{575A2F2B-2B4F-43EC-818C-B7E12DDDF3E9}" type="presParOf" srcId="{01DD0F12-12F5-4D40-B8E1-50F8BA73202A}" destId="{9ADB6F5D-9C9F-48E8-BA73-30A7CB91DDA9}" srcOrd="0" destOrd="0" presId="urn:microsoft.com/office/officeart/2005/8/layout/list1#2"/>
     <dgm:cxn modelId="{9CB32CDE-348E-41D1-B8F9-95CA9A2BB358}" type="presParOf" srcId="{9ADB6F5D-9C9F-48E8-BA73-30A7CB91DDA9}" destId="{1DA2DBA8-FF13-4046-9A4B-FA26A7A8AE04}" srcOrd="0" destOrd="0" presId="urn:microsoft.com/office/officeart/2005/8/layout/list1#2"/>
     <dgm:cxn modelId="{EFC7B67D-EA87-4273-8C2D-2368BBB7218A}" type="presParOf" srcId="{9ADB6F5D-9C9F-48E8-BA73-30A7CB91DDA9}" destId="{E022AD64-6C14-41D5-BC9F-2BFBC0D6C3E0}" srcOrd="1" destOrd="0" presId="urn:microsoft.com/office/officeart/2005/8/layout/list1#2"/>
@@ -5020,13 +5008,7 @@
             <a:rPr lang="en-US" dirty="0" smtClean="0">
               <a:latin typeface="+mj-lt"/>
             </a:rPr>
-            <a:t>Home </a:t>
-          </a:r>
-          <a:r>
-            <a:rPr lang="en-US" dirty="0" smtClean="0">
-              <a:latin typeface="+mj-lt"/>
-            </a:rPr>
-            <a:t>page for users</a:t>
+            <a:t>Home page for users</a:t>
           </a:r>
           <a:endParaRPr lang="en-US" dirty="0">
             <a:latin typeface="+mj-lt"/>
@@ -5473,27 +5455,27 @@
     </dgm:pt>
   </dgm:ptLst>
   <dgm:cxnLst>
+    <dgm:cxn modelId="{045A973B-2793-4233-B0DD-A06A4D9E568A}" srcId="{B7B4D503-0B80-4460-922F-678D7B3B9A0D}" destId="{35CE50FE-FA6B-438A-BDBA-9B273E6736BA}" srcOrd="0" destOrd="0" parTransId="{041EA2AA-79BF-4E81-BE26-7602451C547A}" sibTransId="{5E917E99-E082-4E09-A2C0-44C12F971A6A}"/>
     <dgm:cxn modelId="{C9AC78AC-F26A-4E3D-A048-278CB05EA888}" type="presOf" srcId="{5758AE60-794A-4504-AA9B-A01CD9912EB4}" destId="{8CFD94E9-0E72-4332-BB5E-36BB60412F17}" srcOrd="0" destOrd="2" presId="urn:microsoft.com/office/officeart/2005/8/layout/list1#2"/>
+    <dgm:cxn modelId="{BD749631-4A51-4D09-829F-95D400FFECE5}" type="presOf" srcId="{866A947F-83BE-480D-AA6F-593F9E9D094C}" destId="{F27E4A0C-8745-4FF3-8C34-9AD928BBECE8}" srcOrd="0" destOrd="0" presId="urn:microsoft.com/office/officeart/2005/8/layout/list1#2"/>
+    <dgm:cxn modelId="{F31BB9C2-827A-4688-946D-A6E18824A2A3}" srcId="{35CE50FE-FA6B-438A-BDBA-9B273E6736BA}" destId="{A23CD68F-4F13-4F50-B3EF-23F373CF2CAE}" srcOrd="3" destOrd="0" parTransId="{121C81A4-86EB-42C7-8374-A08A512773B8}" sibTransId="{30AF9145-00E7-4F57-9F96-B16353C9BD11}"/>
+    <dgm:cxn modelId="{6773798E-A682-4CF5-B382-CED39440F60F}" srcId="{B7B4D503-0B80-4460-922F-678D7B3B9A0D}" destId="{866A947F-83BE-480D-AA6F-593F9E9D094C}" srcOrd="1" destOrd="0" parTransId="{918CCBE6-D77D-4925-BB46-AC3B1AF0AA52}" sibTransId="{F1151127-47D2-4FB3-9E04-AAF4C7994627}"/>
+    <dgm:cxn modelId="{5DA867DB-4E75-42E6-8B5A-1F2B65992BA7}" type="presOf" srcId="{B7B4D503-0B80-4460-922F-678D7B3B9A0D}" destId="{01DD0F12-12F5-4D40-B8E1-50F8BA73202A}" srcOrd="0" destOrd="0" presId="urn:microsoft.com/office/officeart/2005/8/layout/list1#2"/>
+    <dgm:cxn modelId="{9DC7DB94-BA09-4B66-A28F-BDA24BFDCDDA}" type="presOf" srcId="{766D07A8-75F4-4550-B24D-C41DF920BC75}" destId="{8CFD94E9-0E72-4332-BB5E-36BB60412F17}" srcOrd="0" destOrd="0" presId="urn:microsoft.com/office/officeart/2005/8/layout/list1#2"/>
+    <dgm:cxn modelId="{5305BA61-0A08-4872-A7E9-3CD59AD4FB27}" type="presOf" srcId="{1BEA5EA1-0903-46A8-953C-BFAA6380B894}" destId="{F901923D-E6E1-47FE-BE41-8B8C66EFA3AF}" srcOrd="0" destOrd="2" presId="urn:microsoft.com/office/officeart/2005/8/layout/list1#2"/>
+    <dgm:cxn modelId="{61A0DA34-0D78-4330-B78E-447D49E22F41}" srcId="{866A947F-83BE-480D-AA6F-593F9E9D094C}" destId="{5758AE60-794A-4504-AA9B-A01CD9912EB4}" srcOrd="2" destOrd="0" parTransId="{7703B121-92EA-4052-A090-35AC8760EEFB}" sibTransId="{6B6BEEB1-8A51-4848-83D1-BF6775062673}"/>
+    <dgm:cxn modelId="{88A3F266-35D7-4FDB-933A-458FE36B4276}" srcId="{35CE50FE-FA6B-438A-BDBA-9B273E6736BA}" destId="{1BEA5EA1-0903-46A8-953C-BFAA6380B894}" srcOrd="2" destOrd="0" parTransId="{7626BE01-410B-4FBC-9DCD-AD255D9CA577}" sibTransId="{15DC27B7-EAE1-49A7-A1B5-0F3DE3D43C37}"/>
+    <dgm:cxn modelId="{DB4358DC-0B86-4C3E-BE35-8311B4C98622}" type="presOf" srcId="{A23CD68F-4F13-4F50-B3EF-23F373CF2CAE}" destId="{F901923D-E6E1-47FE-BE41-8B8C66EFA3AF}" srcOrd="0" destOrd="3" presId="urn:microsoft.com/office/officeart/2005/8/layout/list1#2"/>
+    <dgm:cxn modelId="{CD2140BB-2C93-47B8-ACA3-E8203BF2DBB4}" type="presOf" srcId="{35CE50FE-FA6B-438A-BDBA-9B273E6736BA}" destId="{1DA2DBA8-FF13-4046-9A4B-FA26A7A8AE04}" srcOrd="0" destOrd="0" presId="urn:microsoft.com/office/officeart/2005/8/layout/list1#2"/>
+    <dgm:cxn modelId="{59C39AC4-AE50-42A8-BA55-45C7704BABCF}" srcId="{35CE50FE-FA6B-438A-BDBA-9B273E6736BA}" destId="{D6414279-7CD1-4D24-AE91-BA432968A40C}" srcOrd="0" destOrd="0" parTransId="{F14F7C14-29A3-48EE-8205-455780C49B79}" sibTransId="{E8B989D6-9BCC-4169-92BB-9F4F2A8F4A69}"/>
+    <dgm:cxn modelId="{38F01130-CB2A-478D-8A12-677434C3AFE2}" type="presOf" srcId="{27DC1B51-8F24-426D-9B05-F2227AC4E2A3}" destId="{F901923D-E6E1-47FE-BE41-8B8C66EFA3AF}" srcOrd="0" destOrd="1" presId="urn:microsoft.com/office/officeart/2005/8/layout/list1#2"/>
+    <dgm:cxn modelId="{FB306DAA-AEF6-4263-91FC-FEF0F60AFCAD}" srcId="{35CE50FE-FA6B-438A-BDBA-9B273E6736BA}" destId="{27DC1B51-8F24-426D-9B05-F2227AC4E2A3}" srcOrd="1" destOrd="0" parTransId="{D9FBFA29-3B16-4414-9B11-8AC4DA72E408}" sibTransId="{EAE58358-5856-41CD-B461-BE8AF9743A87}"/>
+    <dgm:cxn modelId="{F6AE2949-5FAF-4ACD-A69C-6BCE438BAC64}" type="presOf" srcId="{866A947F-83BE-480D-AA6F-593F9E9D094C}" destId="{D30DD92C-7916-4FD7-9816-0AB63801BF73}" srcOrd="1" destOrd="0" presId="urn:microsoft.com/office/officeart/2005/8/layout/list1#2"/>
+    <dgm:cxn modelId="{DE4C98CE-7EF8-48A0-A0C4-4E2C192BC7A5}" type="presOf" srcId="{D6414279-7CD1-4D24-AE91-BA432968A40C}" destId="{F901923D-E6E1-47FE-BE41-8B8C66EFA3AF}" srcOrd="0" destOrd="0" presId="urn:microsoft.com/office/officeart/2005/8/layout/list1#2"/>
     <dgm:cxn modelId="{876CB1BD-F97D-4315-AF3C-4B8873154413}" type="presOf" srcId="{35CE50FE-FA6B-438A-BDBA-9B273E6736BA}" destId="{E022AD64-6C14-41D5-BC9F-2BFBC0D6C3E0}" srcOrd="1" destOrd="0" presId="urn:microsoft.com/office/officeart/2005/8/layout/list1#2"/>
     <dgm:cxn modelId="{2EB6B284-A937-4AE6-844A-3F4E2221479E}" type="presOf" srcId="{0576C511-E5DD-4E1E-A91B-1EE014EB6F6A}" destId="{8CFD94E9-0E72-4332-BB5E-36BB60412F17}" srcOrd="0" destOrd="1" presId="urn:microsoft.com/office/officeart/2005/8/layout/list1#2"/>
+    <dgm:cxn modelId="{81C2E732-AA19-441B-A0A3-5E026EAC430B}" srcId="{866A947F-83BE-480D-AA6F-593F9E9D094C}" destId="{766D07A8-75F4-4550-B24D-C41DF920BC75}" srcOrd="0" destOrd="0" parTransId="{6A268530-93C2-468C-9749-C96E4BCBCA8D}" sibTransId="{F94A9010-67F7-4322-B0FD-DA78A9019B18}"/>
     <dgm:cxn modelId="{CFB7A30B-32A2-475E-858D-901D4540C060}" srcId="{866A947F-83BE-480D-AA6F-593F9E9D094C}" destId="{0576C511-E5DD-4E1E-A91B-1EE014EB6F6A}" srcOrd="1" destOrd="0" parTransId="{153DE7D9-B81A-4C0F-806A-F8B8D2443A2C}" sibTransId="{388087CB-D4DE-43EF-BBF0-E99B504A73C2}"/>
-    <dgm:cxn modelId="{F6AE2949-5FAF-4ACD-A69C-6BCE438BAC64}" type="presOf" srcId="{866A947F-83BE-480D-AA6F-593F9E9D094C}" destId="{D30DD92C-7916-4FD7-9816-0AB63801BF73}" srcOrd="1" destOrd="0" presId="urn:microsoft.com/office/officeart/2005/8/layout/list1#2"/>
-    <dgm:cxn modelId="{F31BB9C2-827A-4688-946D-A6E18824A2A3}" srcId="{35CE50FE-FA6B-438A-BDBA-9B273E6736BA}" destId="{A23CD68F-4F13-4F50-B3EF-23F373CF2CAE}" srcOrd="3" destOrd="0" parTransId="{121C81A4-86EB-42C7-8374-A08A512773B8}" sibTransId="{30AF9145-00E7-4F57-9F96-B16353C9BD11}"/>
-    <dgm:cxn modelId="{6773798E-A682-4CF5-B382-CED39440F60F}" srcId="{B7B4D503-0B80-4460-922F-678D7B3B9A0D}" destId="{866A947F-83BE-480D-AA6F-593F9E9D094C}" srcOrd="1" destOrd="0" parTransId="{918CCBE6-D77D-4925-BB46-AC3B1AF0AA52}" sibTransId="{F1151127-47D2-4FB3-9E04-AAF4C7994627}"/>
-    <dgm:cxn modelId="{38F01130-CB2A-478D-8A12-677434C3AFE2}" type="presOf" srcId="{27DC1B51-8F24-426D-9B05-F2227AC4E2A3}" destId="{F901923D-E6E1-47FE-BE41-8B8C66EFA3AF}" srcOrd="0" destOrd="1" presId="urn:microsoft.com/office/officeart/2005/8/layout/list1#2"/>
-    <dgm:cxn modelId="{CD2140BB-2C93-47B8-ACA3-E8203BF2DBB4}" type="presOf" srcId="{35CE50FE-FA6B-438A-BDBA-9B273E6736BA}" destId="{1DA2DBA8-FF13-4046-9A4B-FA26A7A8AE04}" srcOrd="0" destOrd="0" presId="urn:microsoft.com/office/officeart/2005/8/layout/list1#2"/>
-    <dgm:cxn modelId="{81C2E732-AA19-441B-A0A3-5E026EAC430B}" srcId="{866A947F-83BE-480D-AA6F-593F9E9D094C}" destId="{766D07A8-75F4-4550-B24D-C41DF920BC75}" srcOrd="0" destOrd="0" parTransId="{6A268530-93C2-468C-9749-C96E4BCBCA8D}" sibTransId="{F94A9010-67F7-4322-B0FD-DA78A9019B18}"/>
-    <dgm:cxn modelId="{DE4C98CE-7EF8-48A0-A0C4-4E2C192BC7A5}" type="presOf" srcId="{D6414279-7CD1-4D24-AE91-BA432968A40C}" destId="{F901923D-E6E1-47FE-BE41-8B8C66EFA3AF}" srcOrd="0" destOrd="0" presId="urn:microsoft.com/office/officeart/2005/8/layout/list1#2"/>
-    <dgm:cxn modelId="{DB4358DC-0B86-4C3E-BE35-8311B4C98622}" type="presOf" srcId="{A23CD68F-4F13-4F50-B3EF-23F373CF2CAE}" destId="{F901923D-E6E1-47FE-BE41-8B8C66EFA3AF}" srcOrd="0" destOrd="3" presId="urn:microsoft.com/office/officeart/2005/8/layout/list1#2"/>
-    <dgm:cxn modelId="{9DC7DB94-BA09-4B66-A28F-BDA24BFDCDDA}" type="presOf" srcId="{766D07A8-75F4-4550-B24D-C41DF920BC75}" destId="{8CFD94E9-0E72-4332-BB5E-36BB60412F17}" srcOrd="0" destOrd="0" presId="urn:microsoft.com/office/officeart/2005/8/layout/list1#2"/>
-    <dgm:cxn modelId="{5DA867DB-4E75-42E6-8B5A-1F2B65992BA7}" type="presOf" srcId="{B7B4D503-0B80-4460-922F-678D7B3B9A0D}" destId="{01DD0F12-12F5-4D40-B8E1-50F8BA73202A}" srcOrd="0" destOrd="0" presId="urn:microsoft.com/office/officeart/2005/8/layout/list1#2"/>
-    <dgm:cxn modelId="{5305BA61-0A08-4872-A7E9-3CD59AD4FB27}" type="presOf" srcId="{1BEA5EA1-0903-46A8-953C-BFAA6380B894}" destId="{F901923D-E6E1-47FE-BE41-8B8C66EFA3AF}" srcOrd="0" destOrd="2" presId="urn:microsoft.com/office/officeart/2005/8/layout/list1#2"/>
-    <dgm:cxn modelId="{FB306DAA-AEF6-4263-91FC-FEF0F60AFCAD}" srcId="{35CE50FE-FA6B-438A-BDBA-9B273E6736BA}" destId="{27DC1B51-8F24-426D-9B05-F2227AC4E2A3}" srcOrd="1" destOrd="0" parTransId="{D9FBFA29-3B16-4414-9B11-8AC4DA72E408}" sibTransId="{EAE58358-5856-41CD-B461-BE8AF9743A87}"/>
-    <dgm:cxn modelId="{BD749631-4A51-4D09-829F-95D400FFECE5}" type="presOf" srcId="{866A947F-83BE-480D-AA6F-593F9E9D094C}" destId="{F27E4A0C-8745-4FF3-8C34-9AD928BBECE8}" srcOrd="0" destOrd="0" presId="urn:microsoft.com/office/officeart/2005/8/layout/list1#2"/>
-    <dgm:cxn modelId="{61A0DA34-0D78-4330-B78E-447D49E22F41}" srcId="{866A947F-83BE-480D-AA6F-593F9E9D094C}" destId="{5758AE60-794A-4504-AA9B-A01CD9912EB4}" srcOrd="2" destOrd="0" parTransId="{7703B121-92EA-4052-A090-35AC8760EEFB}" sibTransId="{6B6BEEB1-8A51-4848-83D1-BF6775062673}"/>
-    <dgm:cxn modelId="{88A3F266-35D7-4FDB-933A-458FE36B4276}" srcId="{35CE50FE-FA6B-438A-BDBA-9B273E6736BA}" destId="{1BEA5EA1-0903-46A8-953C-BFAA6380B894}" srcOrd="2" destOrd="0" parTransId="{7626BE01-410B-4FBC-9DCD-AD255D9CA577}" sibTransId="{15DC27B7-EAE1-49A7-A1B5-0F3DE3D43C37}"/>
-    <dgm:cxn modelId="{59C39AC4-AE50-42A8-BA55-45C7704BABCF}" srcId="{35CE50FE-FA6B-438A-BDBA-9B273E6736BA}" destId="{D6414279-7CD1-4D24-AE91-BA432968A40C}" srcOrd="0" destOrd="0" parTransId="{F14F7C14-29A3-48EE-8205-455780C49B79}" sibTransId="{E8B989D6-9BCC-4169-92BB-9F4F2A8F4A69}"/>
-    <dgm:cxn modelId="{045A973B-2793-4233-B0DD-A06A4D9E568A}" srcId="{B7B4D503-0B80-4460-922F-678D7B3B9A0D}" destId="{35CE50FE-FA6B-438A-BDBA-9B273E6736BA}" srcOrd="0" destOrd="0" parTransId="{041EA2AA-79BF-4E81-BE26-7602451C547A}" sibTransId="{5E917E99-E082-4E09-A2C0-44C12F971A6A}"/>
     <dgm:cxn modelId="{575A2F2B-2B4F-43EC-818C-B7E12DDDF3E9}" type="presParOf" srcId="{01DD0F12-12F5-4D40-B8E1-50F8BA73202A}" destId="{9ADB6F5D-9C9F-48E8-BA73-30A7CB91DDA9}" srcOrd="0" destOrd="0" presId="urn:microsoft.com/office/officeart/2005/8/layout/list1#2"/>
     <dgm:cxn modelId="{9CB32CDE-348E-41D1-B8F9-95CA9A2BB358}" type="presParOf" srcId="{9ADB6F5D-9C9F-48E8-BA73-30A7CB91DDA9}" destId="{1DA2DBA8-FF13-4046-9A4B-FA26A7A8AE04}" srcOrd="0" destOrd="0" presId="urn:microsoft.com/office/officeart/2005/8/layout/list1#2"/>
     <dgm:cxn modelId="{EFC7B67D-EA87-4273-8C2D-2368BBB7218A}" type="presParOf" srcId="{9ADB6F5D-9C9F-48E8-BA73-30A7CB91DDA9}" destId="{E022AD64-6C14-41D5-BC9F-2BFBC0D6C3E0}" srcOrd="1" destOrd="0" presId="urn:microsoft.com/office/officeart/2005/8/layout/list1#2"/>
@@ -5666,13 +5648,7 @@
             <a:rPr lang="en-US" dirty="0" smtClean="0">
               <a:latin typeface="+mj-lt"/>
             </a:rPr>
-            <a:t>Home page for </a:t>
-          </a:r>
-          <a:r>
-            <a:rPr lang="en-US" dirty="0" smtClean="0">
-              <a:latin typeface="+mj-lt"/>
-            </a:rPr>
-            <a:t>users and admin</a:t>
+            <a:t>Home page for users and admin</a:t>
           </a:r>
           <a:endParaRPr lang="en-US" dirty="0">
             <a:latin typeface="+mj-lt"/>
@@ -5754,13 +5730,7 @@
             <a:rPr lang="en-US" dirty="0" smtClean="0">
               <a:latin typeface="+mj-lt"/>
             </a:rPr>
-            <a:t>Chat </a:t>
-          </a:r>
-          <a:r>
-            <a:rPr lang="en-US" dirty="0" smtClean="0">
-              <a:latin typeface="+mj-lt"/>
-            </a:rPr>
-            <a:t>functionality</a:t>
+            <a:t>Chat functionality</a:t>
           </a:r>
           <a:endParaRPr lang="en-US" dirty="0">
             <a:latin typeface="+mj-lt"/>
@@ -5802,13 +5772,7 @@
             <a:rPr lang="en-US" dirty="0" smtClean="0">
               <a:latin typeface="+mj-lt"/>
             </a:rPr>
-            <a:t>Products </a:t>
-          </a:r>
-          <a:r>
-            <a:rPr lang="en-US" dirty="0" smtClean="0">
-              <a:latin typeface="+mj-lt"/>
-            </a:rPr>
-            <a:t>Details</a:t>
+            <a:t>Products Details</a:t>
           </a:r>
           <a:endParaRPr lang="en-US" dirty="0">
             <a:latin typeface="+mj-lt"/>
@@ -6051,8 +6015,8 @@
   <dgm:cxnLst>
     <dgm:cxn modelId="{9F873517-B31D-4C0D-ADCD-824D633F26D5}" srcId="{35CE50FE-FA6B-438A-BDBA-9B273E6736BA}" destId="{2EF53746-B494-42C1-B682-E8044416D87A}" srcOrd="1" destOrd="0" parTransId="{F3F7E221-E014-4D88-A6C6-C0BBD6CFE33A}" sibTransId="{1CA5516F-DBDC-4209-890E-ED8352926E1F}"/>
     <dgm:cxn modelId="{876CB1BD-F97D-4315-AF3C-4B8873154413}" type="presOf" srcId="{35CE50FE-FA6B-438A-BDBA-9B273E6736BA}" destId="{E022AD64-6C14-41D5-BC9F-2BFBC0D6C3E0}" srcOrd="1" destOrd="0" presId="urn:microsoft.com/office/officeart/2005/8/layout/list1#2"/>
+    <dgm:cxn modelId="{F6AE2949-5FAF-4ACD-A69C-6BCE438BAC64}" type="presOf" srcId="{866A947F-83BE-480D-AA6F-593F9E9D094C}" destId="{D30DD92C-7916-4FD7-9816-0AB63801BF73}" srcOrd="1" destOrd="0" presId="urn:microsoft.com/office/officeart/2005/8/layout/list1#2"/>
     <dgm:cxn modelId="{6773798E-A682-4CF5-B382-CED39440F60F}" srcId="{B7B4D503-0B80-4460-922F-678D7B3B9A0D}" destId="{866A947F-83BE-480D-AA6F-593F9E9D094C}" srcOrd="1" destOrd="0" parTransId="{918CCBE6-D77D-4925-BB46-AC3B1AF0AA52}" sibTransId="{F1151127-47D2-4FB3-9E04-AAF4C7994627}"/>
-    <dgm:cxn modelId="{F6AE2949-5FAF-4ACD-A69C-6BCE438BAC64}" type="presOf" srcId="{866A947F-83BE-480D-AA6F-593F9E9D094C}" destId="{D30DD92C-7916-4FD7-9816-0AB63801BF73}" srcOrd="1" destOrd="0" presId="urn:microsoft.com/office/officeart/2005/8/layout/list1#2"/>
     <dgm:cxn modelId="{CD2140BB-2C93-47B8-ACA3-E8203BF2DBB4}" type="presOf" srcId="{35CE50FE-FA6B-438A-BDBA-9B273E6736BA}" destId="{1DA2DBA8-FF13-4046-9A4B-FA26A7A8AE04}" srcOrd="0" destOrd="0" presId="urn:microsoft.com/office/officeart/2005/8/layout/list1#2"/>
     <dgm:cxn modelId="{81C2E732-AA19-441B-A0A3-5E026EAC430B}" srcId="{866A947F-83BE-480D-AA6F-593F9E9D094C}" destId="{766D07A8-75F4-4550-B24D-C41DF920BC75}" srcOrd="0" destOrd="0" parTransId="{6A268530-93C2-468C-9749-C96E4BCBCA8D}" sibTransId="{F94A9010-67F7-4322-B0FD-DA78A9019B18}"/>
     <dgm:cxn modelId="{9DC7DB94-BA09-4B66-A28F-BDA24BFDCDDA}" type="presOf" srcId="{766D07A8-75F4-4550-B24D-C41DF920BC75}" destId="{8CFD94E9-0E72-4332-BB5E-36BB60412F17}" srcOrd="0" destOrd="0" presId="urn:microsoft.com/office/officeart/2005/8/layout/list1#2"/>
@@ -6060,9 +6024,9 @@
     <dgm:cxn modelId="{5305BA61-0A08-4872-A7E9-3CD59AD4FB27}" type="presOf" srcId="{1BEA5EA1-0903-46A8-953C-BFAA6380B894}" destId="{F901923D-E6E1-47FE-BE41-8B8C66EFA3AF}" srcOrd="0" destOrd="0" presId="urn:microsoft.com/office/officeart/2005/8/layout/list1#2"/>
     <dgm:cxn modelId="{815830CE-AB90-470F-8E98-37830B19D5D6}" srcId="{35CE50FE-FA6B-438A-BDBA-9B273E6736BA}" destId="{F22C7FA7-4226-418C-9A26-54B6586D963F}" srcOrd="3" destOrd="0" parTransId="{6F883F10-E6D7-41E6-AEA8-B703ED7D5B73}" sibTransId="{B015DED0-C9C2-48E2-BDEE-6161C61E1ED1}"/>
     <dgm:cxn modelId="{6852BF3B-644D-414F-A203-E133DE116D0A}" srcId="{866A947F-83BE-480D-AA6F-593F9E9D094C}" destId="{2B7782AA-D590-46FB-A9D7-21AFFA699761}" srcOrd="2" destOrd="0" parTransId="{326308CF-0572-4ED9-87A8-0F957B385A48}" sibTransId="{3D3E16CC-825B-4171-B123-D772B24E1FD8}"/>
-    <dgm:cxn modelId="{BD749631-4A51-4D09-829F-95D400FFECE5}" type="presOf" srcId="{866A947F-83BE-480D-AA6F-593F9E9D094C}" destId="{F27E4A0C-8745-4FF3-8C34-9AD928BBECE8}" srcOrd="0" destOrd="0" presId="urn:microsoft.com/office/officeart/2005/8/layout/list1#2"/>
     <dgm:cxn modelId="{722B6345-D78D-452E-A0CA-D313BAAC1DD8}" type="presOf" srcId="{F22C7FA7-4226-418C-9A26-54B6586D963F}" destId="{F901923D-E6E1-47FE-BE41-8B8C66EFA3AF}" srcOrd="0" destOrd="3" presId="urn:microsoft.com/office/officeart/2005/8/layout/list1#2"/>
     <dgm:cxn modelId="{5E525774-A454-4D27-B129-9DA37D2B6864}" type="presOf" srcId="{253542EB-FDDA-4571-97CE-E268B1A4899A}" destId="{8CFD94E9-0E72-4332-BB5E-36BB60412F17}" srcOrd="0" destOrd="1" presId="urn:microsoft.com/office/officeart/2005/8/layout/list1#2"/>
+    <dgm:cxn modelId="{BD749631-4A51-4D09-829F-95D400FFECE5}" type="presOf" srcId="{866A947F-83BE-480D-AA6F-593F9E9D094C}" destId="{F27E4A0C-8745-4FF3-8C34-9AD928BBECE8}" srcOrd="0" destOrd="0" presId="urn:microsoft.com/office/officeart/2005/8/layout/list1#2"/>
     <dgm:cxn modelId="{785066EA-A35F-45F7-9CCE-CA87D70108DA}" srcId="{866A947F-83BE-480D-AA6F-593F9E9D094C}" destId="{253542EB-FDDA-4571-97CE-E268B1A4899A}" srcOrd="1" destOrd="0" parTransId="{00897789-9D3B-4857-AC6A-82EE00BCA5E7}" sibTransId="{71859AB7-4210-4A87-A178-D175936E9BE3}"/>
     <dgm:cxn modelId="{2F740252-ACFB-4078-A682-91D9850207D3}" type="presOf" srcId="{2B7782AA-D590-46FB-A9D7-21AFFA699761}" destId="{8CFD94E9-0E72-4332-BB5E-36BB60412F17}" srcOrd="0" destOrd="2" presId="urn:microsoft.com/office/officeart/2005/8/layout/list1#2"/>
     <dgm:cxn modelId="{04C793D4-E8CA-45C5-8B75-ED6F3A2F8870}" type="presOf" srcId="{2EF53746-B494-42C1-B682-E8044416D87A}" destId="{F901923D-E6E1-47FE-BE41-8B8C66EFA3AF}" srcOrd="0" destOrd="1" presId="urn:microsoft.com/office/officeart/2005/8/layout/list1#2"/>
@@ -6712,19 +6676,7 @@
             <a:rPr lang="en-US" dirty="0" smtClean="0">
               <a:latin typeface="+mj-lt"/>
             </a:rPr>
-            <a:t>Current </a:t>
-          </a:r>
-          <a:r>
-            <a:rPr lang="en-US" dirty="0" smtClean="0">
-              <a:latin typeface="+mj-lt"/>
-            </a:rPr>
-            <a:t>orders details </a:t>
-          </a:r>
-          <a:r>
-            <a:rPr lang="en-US" dirty="0" smtClean="0">
-              <a:latin typeface="+mj-lt"/>
-            </a:rPr>
-            <a:t>page</a:t>
+            <a:t>Current orders details page</a:t>
           </a:r>
           <a:endParaRPr lang="en-US" dirty="0">
             <a:latin typeface="+mj-lt"/>
@@ -7155,13 +7107,7 @@
             <a:rPr lang="en-US" sz="2000" dirty="0" smtClean="0">
               <a:latin typeface="+mj-lt"/>
             </a:rPr>
-            <a:t>Order history for </a:t>
-          </a:r>
-          <a:r>
-            <a:rPr lang="en-US" sz="2000" dirty="0" smtClean="0">
-              <a:latin typeface="+mj-lt"/>
-            </a:rPr>
-            <a:t>users</a:t>
+            <a:t>Order history for users</a:t>
           </a:r>
           <a:endParaRPr lang="en-US" sz="2000" dirty="0">
             <a:latin typeface="+mj-lt"/>
@@ -7600,13 +7546,7 @@
             <a:rPr lang="en-US" sz="2000" kern="1200" dirty="0" smtClean="0">
               <a:latin typeface="+mj-lt"/>
             </a:rPr>
-            <a:t>Header &amp; </a:t>
-          </a:r>
-          <a:r>
-            <a:rPr lang="en-US" sz="2000" kern="1200" dirty="0" smtClean="0">
-              <a:latin typeface="+mj-lt"/>
-            </a:rPr>
-            <a:t>Footer for user and admin</a:t>
+            <a:t>Header &amp; Footer for user and admin</a:t>
           </a:r>
           <a:endParaRPr lang="en-US" sz="2000" kern="1200" dirty="0">
             <a:latin typeface="+mj-lt"/>
@@ -7652,13 +7592,7 @@
             <a:rPr lang="en-US" sz="2000" kern="1200" dirty="0" smtClean="0">
               <a:latin typeface="+mj-lt"/>
             </a:rPr>
-            <a:t>Admin drug </a:t>
-          </a:r>
-          <a:r>
-            <a:rPr lang="en-US" sz="2000" kern="1200" dirty="0" smtClean="0">
-              <a:latin typeface="+mj-lt"/>
-            </a:rPr>
-            <a:t>management – add products</a:t>
+            <a:t>Admin drug management – add products</a:t>
           </a:r>
           <a:endParaRPr lang="en-US" sz="2000" kern="1200" dirty="0">
             <a:latin typeface="+mj-lt"/>
@@ -8040,13 +7974,7 @@
             <a:rPr lang="en-US" sz="2000" kern="1200" dirty="0" smtClean="0">
               <a:latin typeface="+mj-lt"/>
             </a:rPr>
-            <a:t>Home </a:t>
-          </a:r>
-          <a:r>
-            <a:rPr lang="en-US" sz="2000" kern="1200" dirty="0" smtClean="0">
-              <a:latin typeface="+mj-lt"/>
-            </a:rPr>
-            <a:t>page for users</a:t>
+            <a:t>Home page for users</a:t>
           </a:r>
           <a:endParaRPr lang="en-US" sz="2000" kern="1200" dirty="0">
             <a:latin typeface="+mj-lt"/>
@@ -8543,13 +8471,7 @@
             <a:rPr lang="en-US" sz="2000" kern="1200" dirty="0" smtClean="0">
               <a:latin typeface="+mj-lt"/>
             </a:rPr>
-            <a:t>Products </a:t>
-          </a:r>
-          <a:r>
-            <a:rPr lang="en-US" sz="2000" kern="1200" dirty="0" smtClean="0">
-              <a:latin typeface="+mj-lt"/>
-            </a:rPr>
-            <a:t>Details</a:t>
+            <a:t>Products Details</a:t>
           </a:r>
           <a:endParaRPr lang="en-US" sz="2000" kern="1200" dirty="0">
             <a:latin typeface="+mj-lt"/>
@@ -8734,13 +8656,7 @@
             <a:rPr lang="en-US" sz="2000" kern="1200" dirty="0" smtClean="0">
               <a:latin typeface="+mj-lt"/>
             </a:rPr>
-            <a:t>Home page for </a:t>
-          </a:r>
-          <a:r>
-            <a:rPr lang="en-US" sz="2000" kern="1200" dirty="0" smtClean="0">
-              <a:latin typeface="+mj-lt"/>
-            </a:rPr>
-            <a:t>users and admin</a:t>
+            <a:t>Home page for users and admin</a:t>
           </a:r>
           <a:endParaRPr lang="en-US" sz="2000" kern="1200" dirty="0">
             <a:latin typeface="+mj-lt"/>
@@ -8786,13 +8702,7 @@
             <a:rPr lang="en-US" sz="2000" kern="1200" dirty="0" smtClean="0">
               <a:latin typeface="+mj-lt"/>
             </a:rPr>
-            <a:t>Chat </a:t>
-          </a:r>
-          <a:r>
-            <a:rPr lang="en-US" sz="2000" kern="1200" dirty="0" smtClean="0">
-              <a:latin typeface="+mj-lt"/>
-            </a:rPr>
-            <a:t>functionality</a:t>
+            <a:t>Chat functionality</a:t>
           </a:r>
           <a:endParaRPr lang="en-US" sz="2000" kern="1200" dirty="0">
             <a:latin typeface="+mj-lt"/>
@@ -9371,19 +9281,7 @@
             <a:rPr lang="en-US" sz="2000" kern="1200" dirty="0" smtClean="0">
               <a:latin typeface="+mj-lt"/>
             </a:rPr>
-            <a:t>Current </a:t>
-          </a:r>
-          <a:r>
-            <a:rPr lang="en-US" sz="2000" kern="1200" dirty="0" smtClean="0">
-              <a:latin typeface="+mj-lt"/>
-            </a:rPr>
-            <a:t>orders details </a:t>
-          </a:r>
-          <a:r>
-            <a:rPr lang="en-US" sz="2000" kern="1200" dirty="0" smtClean="0">
-              <a:latin typeface="+mj-lt"/>
-            </a:rPr>
-            <a:t>page</a:t>
+            <a:t>Current orders details page</a:t>
           </a:r>
           <a:endParaRPr lang="en-US" sz="2000" kern="1200" dirty="0">
             <a:latin typeface="+mj-lt"/>
@@ -9788,13 +9686,7 @@
             <a:rPr lang="en-US" sz="2000" kern="1200" dirty="0" smtClean="0">
               <a:latin typeface="+mj-lt"/>
             </a:rPr>
-            <a:t>Order history for </a:t>
-          </a:r>
-          <a:r>
-            <a:rPr lang="en-US" sz="2000" kern="1200" dirty="0" smtClean="0">
-              <a:latin typeface="+mj-lt"/>
-            </a:rPr>
-            <a:t>users</a:t>
+            <a:t>Order history for users</a:t>
           </a:r>
           <a:endParaRPr lang="en-US" sz="2000" kern="1200" dirty="0">
             <a:latin typeface="+mj-lt"/>
@@ -18369,7 +18261,7 @@
             <a:fld id="{B61BEF0D-F0BB-DE4B-95CE-6DB70DBA9567}" type="datetimeFigureOut">
               <a:rPr lang="en-US" dirty="0"/>
               <a:pPr/>
-              <a:t>11/17/2020</a:t>
+              <a:t>12/1/2020</a:t>
             </a:fld>
             <a:endParaRPr lang="en-US" dirty="0"/>
           </a:p>
@@ -18617,7 +18509,7 @@
             <a:fld id="{B61BEF0D-F0BB-DE4B-95CE-6DB70DBA9567}" type="datetimeFigureOut">
               <a:rPr lang="en-US" dirty="0"/>
               <a:pPr/>
-              <a:t>11/17/2020</a:t>
+              <a:t>12/1/2020</a:t>
             </a:fld>
             <a:endParaRPr lang="en-US" dirty="0"/>
           </a:p>
@@ -18928,7 +18820,7 @@
             <a:fld id="{B61BEF0D-F0BB-DE4B-95CE-6DB70DBA9567}" type="datetimeFigureOut">
               <a:rPr lang="en-US" dirty="0"/>
               <a:pPr/>
-              <a:t>11/17/2020</a:t>
+              <a:t>12/1/2020</a:t>
             </a:fld>
             <a:endParaRPr lang="en-US" dirty="0"/>
           </a:p>
@@ -19266,7 +19158,7 @@
             <a:fld id="{B61BEF0D-F0BB-DE4B-95CE-6DB70DBA9567}" type="datetimeFigureOut">
               <a:rPr lang="en-US" dirty="0"/>
               <a:pPr/>
-              <a:t>11/17/2020</a:t>
+              <a:t>12/1/2020</a:t>
             </a:fld>
             <a:endParaRPr lang="en-US" dirty="0"/>
           </a:p>
@@ -19577,7 +19469,7 @@
             <a:fld id="{B61BEF0D-F0BB-DE4B-95CE-6DB70DBA9567}" type="datetimeFigureOut">
               <a:rPr lang="en-US" dirty="0"/>
               <a:pPr/>
-              <a:t>11/17/2020</a:t>
+              <a:t>12/1/2020</a:t>
             </a:fld>
             <a:endParaRPr lang="en-US" dirty="0"/>
           </a:p>
@@ -19967,7 +19859,7 @@
             <a:fld id="{B61BEF0D-F0BB-DE4B-95CE-6DB70DBA9567}" type="datetimeFigureOut">
               <a:rPr lang="en-US" dirty="0"/>
               <a:pPr/>
-              <a:t>11/17/2020</a:t>
+              <a:t>12/1/2020</a:t>
             </a:fld>
             <a:endParaRPr lang="en-US" dirty="0"/>
           </a:p>
@@ -20133,7 +20025,7 @@
           <a:p>
             <a:fld id="{55C6B4A9-1611-4792-9094-5F34BCA07E0B}" type="datetimeFigureOut">
               <a:rPr lang="en-US" dirty="0"/>
-              <a:t>11/17/2020</a:t>
+              <a:t>12/1/2020</a:t>
             </a:fld>
             <a:endParaRPr lang="en-US" dirty="0"/>
           </a:p>
@@ -20309,7 +20201,7 @@
             <a:fld id="{B61BEF0D-F0BB-DE4B-95CE-6DB70DBA9567}" type="datetimeFigureOut">
               <a:rPr lang="en-US" dirty="0"/>
               <a:pPr/>
-              <a:t>11/17/2020</a:t>
+              <a:t>12/1/2020</a:t>
             </a:fld>
             <a:endParaRPr lang="en-US" dirty="0"/>
           </a:p>
@@ -20482,7 +20374,7 @@
             <a:fld id="{B61BEF0D-F0BB-DE4B-95CE-6DB70DBA9567}" type="datetimeFigureOut">
               <a:rPr lang="en-US" dirty="0"/>
               <a:pPr/>
-              <a:t>11/17/2020</a:t>
+              <a:t>12/1/2020</a:t>
             </a:fld>
             <a:endParaRPr lang="en-US" dirty="0"/>
           </a:p>
@@ -20726,7 +20618,7 @@
             <a:fld id="{B61BEF0D-F0BB-DE4B-95CE-6DB70DBA9567}" type="datetimeFigureOut">
               <a:rPr lang="en-US" dirty="0"/>
               <a:pPr/>
-              <a:t>11/17/2020</a:t>
+              <a:t>12/1/2020</a:t>
             </a:fld>
             <a:endParaRPr lang="en-US" dirty="0"/>
           </a:p>
@@ -20954,7 +20846,7 @@
           <a:p>
             <a:fld id="{EB712588-04B1-427B-82EE-E8DB90309F08}" type="datetimeFigureOut">
               <a:rPr lang="en-US" dirty="0"/>
-              <a:t>11/17/2020</a:t>
+              <a:t>12/1/2020</a:t>
             </a:fld>
             <a:endParaRPr lang="en-US" dirty="0"/>
           </a:p>
@@ -21324,7 +21216,7 @@
             <a:fld id="{B61BEF0D-F0BB-DE4B-95CE-6DB70DBA9567}" type="datetimeFigureOut">
               <a:rPr lang="en-US" dirty="0"/>
               <a:pPr/>
-              <a:t>11/17/2020</a:t>
+              <a:t>12/1/2020</a:t>
             </a:fld>
             <a:endParaRPr lang="en-US" dirty="0"/>
           </a:p>
@@ -21444,7 +21336,7 @@
             <a:fld id="{B61BEF0D-F0BB-DE4B-95CE-6DB70DBA9567}" type="datetimeFigureOut">
               <a:rPr lang="en-US" dirty="0"/>
               <a:pPr/>
-              <a:t>11/17/2020</a:t>
+              <a:t>12/1/2020</a:t>
             </a:fld>
             <a:endParaRPr lang="en-US" dirty="0"/>
           </a:p>
@@ -21536,7 +21428,7 @@
             <a:fld id="{B61BEF0D-F0BB-DE4B-95CE-6DB70DBA9567}" type="datetimeFigureOut">
               <a:rPr lang="en-US" dirty="0"/>
               <a:pPr/>
-              <a:t>11/17/2020</a:t>
+              <a:t>12/1/2020</a:t>
             </a:fld>
             <a:endParaRPr lang="en-US" dirty="0"/>
           </a:p>
@@ -21787,7 +21679,7 @@
           <a:p>
             <a:fld id="{42A54C80-263E-416B-A8E0-580EDEADCBDC}" type="datetimeFigureOut">
               <a:rPr lang="en-US" dirty="0"/>
-              <a:t>11/17/2020</a:t>
+              <a:t>12/1/2020</a:t>
             </a:fld>
             <a:endParaRPr lang="en-US" dirty="0"/>
           </a:p>
@@ -22046,7 +21938,7 @@
             <a:fld id="{B61BEF0D-F0BB-DE4B-95CE-6DB70DBA9567}" type="datetimeFigureOut">
               <a:rPr lang="en-US" dirty="0"/>
               <a:pPr/>
-              <a:t>11/17/2020</a:t>
+              <a:t>12/1/2020</a:t>
             </a:fld>
             <a:endParaRPr lang="en-US" dirty="0"/>
           </a:p>
@@ -22786,7 +22678,7 @@
             <a:fld id="{B61BEF0D-F0BB-DE4B-95CE-6DB70DBA9567}" type="datetimeFigureOut">
               <a:rPr lang="en-US" dirty="0"/>
               <a:pPr/>
-              <a:t>11/17/2020</a:t>
+              <a:t>12/1/2020</a:t>
             </a:fld>
             <a:endParaRPr lang="en-US" dirty="0"/>
           </a:p>
@@ -23444,31 +23336,22 @@
           <a:p>
             <a:pPr algn="l"/>
             <a:r>
-              <a:rPr lang="en-US" sz="2400" dirty="0" err="1">
-                <a:solidFill>
-                  <a:schemeClr val="tx1"/>
-                </a:solidFill>
-                <a:latin typeface="+mj-lt"/>
-              </a:rPr>
-              <a:t>Akhitha</a:t>
-            </a:r>
-            <a:r>
               <a:rPr lang="en-US" sz="2400" dirty="0">
                 <a:solidFill>
                   <a:schemeClr val="tx1"/>
                 </a:solidFill>
                 <a:latin typeface="+mj-lt"/>
               </a:rPr>
-              <a:t> </a:t>
+              <a:t>Akhitha </a:t>
             </a:r>
             <a:r>
-              <a:rPr lang="en-US" sz="2400" dirty="0" err="1">
+              <a:rPr lang="en-US" sz="2400" dirty="0" smtClean="0">
                 <a:solidFill>
                   <a:schemeClr val="tx1"/>
                 </a:solidFill>
                 <a:latin typeface="+mj-lt"/>
               </a:rPr>
-              <a:t>Thumula</a:t>
+              <a:t>Tumula</a:t>
             </a:r>
             <a:endParaRPr lang="en-US" sz="2400" dirty="0">
               <a:solidFill>
@@ -24080,11 +23963,7 @@
           <a:p>
             <a:r>
               <a:rPr lang="en-US" sz="6600" dirty="0" smtClean="0"/>
-              <a:t>Any questions</a:t>
-            </a:r>
-            <a:r>
-              <a:rPr lang="en-US" sz="6600" dirty="0" smtClean="0"/>
-              <a:t>?</a:t>
+              <a:t>Any questions?</a:t>
             </a:r>
             <a:endParaRPr lang="en-US" sz="6600" dirty="0"/>
           </a:p>
@@ -24906,16 +24785,7 @@
                 </a:solidFill>
                 <a:latin typeface="+mj-lt"/>
               </a:rPr>
-              <a:t>Responsible </a:t>
-            </a:r>
-            <a:r>
-              <a:rPr lang="en-US" sz="2400" dirty="0" smtClean="0">
-                <a:solidFill>
-                  <a:schemeClr val="tx1"/>
-                </a:solidFill>
-                <a:latin typeface="+mj-lt"/>
-              </a:rPr>
-              <a:t>tasks</a:t>
+              <a:t>Responsible tasks</a:t>
             </a:r>
             <a:endParaRPr lang="en-US" sz="2400" dirty="0">
               <a:solidFill>
@@ -25059,16 +24929,7 @@
                 </a:solidFill>
                 <a:latin typeface="+mj-lt"/>
               </a:rPr>
-              <a:t>The drug provider will add the medicine that are available in store and general users will buy the products online from the providers</a:t>
-            </a:r>
-            <a:r>
-              <a:rPr lang="en-US" sz="2000" dirty="0" smtClean="0">
-                <a:solidFill>
-                  <a:schemeClr val="tx1"/>
-                </a:solidFill>
-                <a:latin typeface="+mj-lt"/>
-              </a:rPr>
-              <a:t>.</a:t>
+              <a:t>The drug provider will add the medicine that are available in store and general users will buy the products online from the providers.</a:t>
             </a:r>
             <a:endParaRPr lang="en-US" sz="2000" dirty="0">
               <a:solidFill>
@@ -25166,25 +25027,7 @@
                 </a:solidFill>
                 <a:latin typeface="+mj-lt"/>
               </a:rPr>
-              <a:t>Users </a:t>
-            </a:r>
-            <a:r>
-              <a:rPr lang="en-US" sz="2000" dirty="0" smtClean="0">
-                <a:solidFill>
-                  <a:schemeClr val="tx1"/>
-                </a:solidFill>
-                <a:latin typeface="+mj-lt"/>
-              </a:rPr>
-              <a:t>can also upload prescription to get the medicine delivered to their address</a:t>
-            </a:r>
-            <a:r>
-              <a:rPr lang="en-US" sz="2000" dirty="0" smtClean="0">
-                <a:solidFill>
-                  <a:schemeClr val="tx1"/>
-                </a:solidFill>
-                <a:latin typeface="+mj-lt"/>
-              </a:rPr>
-              <a:t>.</a:t>
+              <a:t>Users can also upload prescription to get the medicine delivered to their address.</a:t>
             </a:r>
           </a:p>
           <a:p>
@@ -25474,13 +25317,13 @@
               <a:buNone/>
             </a:pPr>
             <a:r>
-              <a:rPr lang="en-US" sz="2400" dirty="0" err="1" smtClean="0">
+              <a:rPr lang="en-US" sz="2400" dirty="0" smtClean="0">
                 <a:solidFill>
                   <a:schemeClr val="tx1"/>
                 </a:solidFill>
                 <a:latin typeface="+mj-lt"/>
               </a:rPr>
-              <a:t>Akhitha</a:t>
+              <a:t>Akhitha </a:t>
             </a:r>
             <a:r>
               <a:rPr lang="en-US" sz="2400" dirty="0" smtClean="0">
@@ -25489,16 +25332,7 @@
                 </a:solidFill>
                 <a:latin typeface="+mj-lt"/>
               </a:rPr>
-              <a:t> </a:t>
-            </a:r>
-            <a:r>
-              <a:rPr lang="en-US" sz="2400" dirty="0" err="1" smtClean="0">
-                <a:solidFill>
-                  <a:schemeClr val="tx1"/>
-                </a:solidFill>
-                <a:latin typeface="+mj-lt"/>
-              </a:rPr>
-              <a:t>Thumula</a:t>
+              <a:t>Tumula</a:t>
             </a:r>
             <a:endParaRPr lang="en-US" sz="2400" dirty="0" smtClean="0">
               <a:solidFill>

</xml_diff>